<commit_message>
Melhorias no relatório e apresentação.
</commit_message>
<xml_diff>
--- a/docs/apresentacao/apresentacao 1.pptx
+++ b/docs/apresentacao/apresentacao 1.pptx
@@ -5,18 +5,19 @@
     <p:sldMasterId id="2147483660" r:id="rId1"/>
   </p:sldMasterIdLst>
   <p:notesMasterIdLst>
-    <p:notesMasterId r:id="rId11"/>
+    <p:notesMasterId r:id="rId12"/>
   </p:notesMasterIdLst>
   <p:sldIdLst>
     <p:sldId id="256" r:id="rId2"/>
     <p:sldId id="280" r:id="rId3"/>
-    <p:sldId id="281" r:id="rId4"/>
-    <p:sldId id="287" r:id="rId5"/>
-    <p:sldId id="282" r:id="rId6"/>
-    <p:sldId id="283" r:id="rId7"/>
-    <p:sldId id="285" r:id="rId8"/>
-    <p:sldId id="284" r:id="rId9"/>
-    <p:sldId id="286" r:id="rId10"/>
+    <p:sldId id="287" r:id="rId4"/>
+    <p:sldId id="281" r:id="rId5"/>
+    <p:sldId id="283" r:id="rId6"/>
+    <p:sldId id="288" r:id="rId7"/>
+    <p:sldId id="282" r:id="rId8"/>
+    <p:sldId id="285" r:id="rId9"/>
+    <p:sldId id="284" r:id="rId10"/>
+    <p:sldId id="286" r:id="rId11"/>
   </p:sldIdLst>
   <p:sldSz cx="12192000" cy="6858000"/>
   <p:notesSz cx="6858000" cy="9144000"/>
@@ -205,7 +206,7 @@
           <a:p>
             <a:fld id="{2BDE29EE-9B87-419F-AF79-1B2A070670AC}" type="datetimeFigureOut">
               <a:rPr lang="pt-BR" smtClean="0"/>
-              <a:t>19/04/2022</a:t>
+              <a:t>20/04/2022</a:t>
             </a:fld>
             <a:endParaRPr lang="pt-BR"/>
           </a:p>
@@ -9265,7 +9266,7 @@
           <a:p>
             <a:fld id="{DC3F9AA5-1F73-45E6-BD6D-7E2F5AFE1A15}" type="datetimeFigureOut">
               <a:rPr lang="pt-BR" smtClean="0"/>
-              <a:t>19/04/2022</a:t>
+              <a:t>20/04/2022</a:t>
             </a:fld>
             <a:endParaRPr lang="pt-BR"/>
           </a:p>
@@ -9472,7 +9473,7 @@
           <a:p>
             <a:fld id="{DC3F9AA5-1F73-45E6-BD6D-7E2F5AFE1A15}" type="datetimeFigureOut">
               <a:rPr lang="pt-BR" smtClean="0"/>
-              <a:t>19/04/2022</a:t>
+              <a:t>20/04/2022</a:t>
             </a:fld>
             <a:endParaRPr lang="pt-BR"/>
           </a:p>
@@ -9652,7 +9653,7 @@
           <a:p>
             <a:fld id="{DC3F9AA5-1F73-45E6-BD6D-7E2F5AFE1A15}" type="datetimeFigureOut">
               <a:rPr lang="pt-BR" smtClean="0"/>
-              <a:t>19/04/2022</a:t>
+              <a:t>20/04/2022</a:t>
             </a:fld>
             <a:endParaRPr lang="pt-BR"/>
           </a:p>
@@ -9857,7 +9858,7 @@
           <a:p>
             <a:fld id="{DC3F9AA5-1F73-45E6-BD6D-7E2F5AFE1A15}" type="datetimeFigureOut">
               <a:rPr lang="pt-BR" smtClean="0"/>
-              <a:t>19/04/2022</a:t>
+              <a:t>20/04/2022</a:t>
             </a:fld>
             <a:endParaRPr lang="pt-BR"/>
           </a:p>
@@ -18755,7 +18756,7 @@
           <a:p>
             <a:fld id="{DC3F9AA5-1F73-45E6-BD6D-7E2F5AFE1A15}" type="datetimeFigureOut">
               <a:rPr lang="pt-BR" smtClean="0"/>
-              <a:t>19/04/2022</a:t>
+              <a:t>20/04/2022</a:t>
             </a:fld>
             <a:endParaRPr lang="pt-BR"/>
           </a:p>
@@ -19029,7 +19030,7 @@
           <a:p>
             <a:fld id="{DC3F9AA5-1F73-45E6-BD6D-7E2F5AFE1A15}" type="datetimeFigureOut">
               <a:rPr lang="pt-BR" smtClean="0"/>
-              <a:t>19/04/2022</a:t>
+              <a:t>20/04/2022</a:t>
             </a:fld>
             <a:endParaRPr lang="pt-BR"/>
           </a:p>
@@ -19427,7 +19428,7 @@
           <a:p>
             <a:fld id="{DC3F9AA5-1F73-45E6-BD6D-7E2F5AFE1A15}" type="datetimeFigureOut">
               <a:rPr lang="pt-BR" smtClean="0"/>
-              <a:t>19/04/2022</a:t>
+              <a:t>20/04/2022</a:t>
             </a:fld>
             <a:endParaRPr lang="pt-BR"/>
           </a:p>
@@ -19545,7 +19546,7 @@
           <a:p>
             <a:fld id="{DC3F9AA5-1F73-45E6-BD6D-7E2F5AFE1A15}" type="datetimeFigureOut">
               <a:rPr lang="pt-BR" smtClean="0"/>
-              <a:t>19/04/2022</a:t>
+              <a:t>20/04/2022</a:t>
             </a:fld>
             <a:endParaRPr lang="pt-BR"/>
           </a:p>
@@ -19640,7 +19641,7 @@
           <a:p>
             <a:fld id="{DC3F9AA5-1F73-45E6-BD6D-7E2F5AFE1A15}" type="datetimeFigureOut">
               <a:rPr lang="pt-BR" smtClean="0"/>
-              <a:t>19/04/2022</a:t>
+              <a:t>20/04/2022</a:t>
             </a:fld>
             <a:endParaRPr lang="pt-BR"/>
           </a:p>
@@ -19930,7 +19931,7 @@
           <a:p>
             <a:fld id="{DC3F9AA5-1F73-45E6-BD6D-7E2F5AFE1A15}" type="datetimeFigureOut">
               <a:rPr lang="pt-BR" smtClean="0"/>
-              <a:t>19/04/2022</a:t>
+              <a:t>20/04/2022</a:t>
             </a:fld>
             <a:endParaRPr lang="pt-BR"/>
           </a:p>
@@ -20210,7 +20211,7 @@
           <a:p>
             <a:fld id="{DC3F9AA5-1F73-45E6-BD6D-7E2F5AFE1A15}" type="datetimeFigureOut">
               <a:rPr lang="pt-BR" smtClean="0"/>
-              <a:t>19/04/2022</a:t>
+              <a:t>20/04/2022</a:t>
             </a:fld>
             <a:endParaRPr lang="pt-BR"/>
           </a:p>
@@ -20460,7 +20461,7 @@
           <a:p>
             <a:fld id="{DC3F9AA5-1F73-45E6-BD6D-7E2F5AFE1A15}" type="datetimeFigureOut">
               <a:rPr lang="pt-BR" smtClean="0"/>
-              <a:t>19/04/2022</a:t>
+              <a:t>20/04/2022</a:t>
             </a:fld>
             <a:endParaRPr lang="pt-BR"/>
           </a:p>
@@ -21062,10 +21063,338 @@
           </a:p>
         </p:txBody>
       </p:sp>
+      <p:pic>
+        <p:nvPicPr>
+          <p:cNvPr id="1026" name="Picture 2" descr="54% dos jovens no Brasil usam internet como lazer">
+            <a:extLst>
+              <a:ext uri="{FF2B5EF4-FFF2-40B4-BE49-F238E27FC236}">
+                <a16:creationId xmlns:a16="http://schemas.microsoft.com/office/drawing/2014/main" id="{6AC76C60-7377-4762-B012-441DD406A43D}"/>
+              </a:ext>
+            </a:extLst>
+          </p:cNvPr>
+          <p:cNvPicPr>
+            <a:picLocks noChangeAspect="1" noChangeArrowheads="1"/>
+          </p:cNvPicPr>
+          <p:nvPr/>
+        </p:nvPicPr>
+        <p:blipFill>
+          <a:blip r:embed="rId2">
+            <a:extLst>
+              <a:ext uri="{28A0092B-C50C-407E-A947-70E740481C1C}">
+                <a14:useLocalDpi xmlns:a14="http://schemas.microsoft.com/office/drawing/2010/main" val="0"/>
+              </a:ext>
+            </a:extLst>
+          </a:blip>
+          <a:srcRect/>
+          <a:stretch>
+            <a:fillRect/>
+          </a:stretch>
+        </p:blipFill>
+        <p:spPr bwMode="auto">
+          <a:xfrm>
+            <a:off x="0" y="-1"/>
+            <a:ext cx="12192000" cy="4580287"/>
+          </a:xfrm>
+          <a:prstGeom prst="rect">
+            <a:avLst/>
+          </a:prstGeom>
+          <a:noFill/>
+          <a:extLst>
+            <a:ext uri="{909E8E84-426E-40DD-AFC4-6F175D3DCCD1}">
+              <a14:hiddenFill xmlns:a14="http://schemas.microsoft.com/office/drawing/2010/main">
+                <a:solidFill>
+                  <a:srgbClr val="FFFFFF"/>
+                </a:solidFill>
+              </a14:hiddenFill>
+            </a:ext>
+          </a:extLst>
+        </p:spPr>
+      </p:pic>
     </p:spTree>
     <p:extLst>
       <p:ext uri="{BB962C8B-B14F-4D97-AF65-F5344CB8AC3E}">
         <p14:creationId xmlns:p14="http://schemas.microsoft.com/office/powerpoint/2010/main" val="1245466002"/>
+      </p:ext>
+    </p:extLst>
+  </p:cSld>
+  <p:clrMapOvr>
+    <a:masterClrMapping/>
+  </p:clrMapOvr>
+</p:sld>
+</file>
+
+<file path=ppt/slides/slide10.xml><?xml version="1.0" encoding="utf-8"?>
+<p:sld xmlns:a="http://schemas.openxmlformats.org/drawingml/2006/main" xmlns:r="http://schemas.openxmlformats.org/officeDocument/2006/relationships" xmlns:p="http://schemas.openxmlformats.org/presentationml/2006/main">
+  <p:cSld>
+    <p:spTree>
+      <p:nvGrpSpPr>
+        <p:cNvPr id="1" name=""/>
+        <p:cNvGrpSpPr/>
+        <p:nvPr/>
+      </p:nvGrpSpPr>
+      <p:grpSpPr>
+        <a:xfrm>
+          <a:off x="0" y="0"/>
+          <a:ext cx="0" cy="0"/>
+          <a:chOff x="0" y="0"/>
+          <a:chExt cx="0" cy="0"/>
+        </a:xfrm>
+      </p:grpSpPr>
+      <p:sp>
+        <p:nvSpPr>
+          <p:cNvPr id="6" name="Espaço Reservado para Texto 5">
+            <a:extLst>
+              <a:ext uri="{FF2B5EF4-FFF2-40B4-BE49-F238E27FC236}">
+                <a16:creationId xmlns:a16="http://schemas.microsoft.com/office/drawing/2014/main" id="{FF277B38-6BF8-40CC-929C-430FF75E2516}"/>
+              </a:ext>
+            </a:extLst>
+          </p:cNvPr>
+          <p:cNvSpPr>
+            <a:spLocks noGrp="1"/>
+          </p:cNvSpPr>
+          <p:nvPr>
+            <p:ph type="body" sz="half" idx="2"/>
+          </p:nvPr>
+        </p:nvSpPr>
+        <p:spPr>
+          <a:xfrm>
+            <a:off x="8534400" y="4970205"/>
+            <a:ext cx="3200400" cy="1463040"/>
+          </a:xfrm>
+        </p:spPr>
+        <p:txBody>
+          <a:bodyPr/>
+          <a:lstStyle/>
+          <a:p>
+            <a:pPr lvl="0"/>
+            <a:r>
+              <a:rPr lang="pt-BR" sz="2400" b="1" dirty="0"/>
+              <a:t>Equipe</a:t>
+            </a:r>
+            <a:endParaRPr lang="pt-BR" b="1" dirty="0"/>
+          </a:p>
+          <a:p>
+            <a:pPr marL="285750" lvl="0" indent="-285750">
+              <a:buFont typeface="Arial" panose="020B0604020202020204" pitchFamily="34" charset="0"/>
+              <a:buChar char="•"/>
+            </a:pPr>
+            <a:r>
+              <a:rPr lang="pt-BR" dirty="0"/>
+              <a:t>Miguel Alves</a:t>
+            </a:r>
+          </a:p>
+          <a:p>
+            <a:pPr marL="285750" lvl="0" indent="-285750">
+              <a:buFont typeface="Arial" panose="020B0604020202020204" pitchFamily="34" charset="0"/>
+              <a:buChar char="•"/>
+            </a:pPr>
+            <a:r>
+              <a:rPr lang="pt-BR" dirty="0" err="1"/>
+              <a:t>Melyssa</a:t>
+            </a:r>
+            <a:r>
+              <a:rPr lang="pt-BR" dirty="0"/>
+              <a:t> Meireles</a:t>
+            </a:r>
+          </a:p>
+          <a:p>
+            <a:pPr marL="285750" lvl="0" indent="-285750">
+              <a:buFont typeface="Arial" panose="020B0604020202020204" pitchFamily="34" charset="0"/>
+              <a:buChar char="•"/>
+            </a:pPr>
+            <a:r>
+              <a:rPr lang="pt-BR" dirty="0"/>
+              <a:t>Gabriel </a:t>
+            </a:r>
+            <a:r>
+              <a:rPr lang="pt-BR" dirty="0" err="1"/>
+              <a:t>Herolt</a:t>
+            </a:r>
+            <a:endParaRPr lang="pt-BR" dirty="0"/>
+          </a:p>
+          <a:p>
+            <a:endParaRPr lang="pt-BR" dirty="0"/>
+          </a:p>
+        </p:txBody>
+      </p:sp>
+      <p:sp>
+        <p:nvSpPr>
+          <p:cNvPr id="8" name="Título 1">
+            <a:extLst>
+              <a:ext uri="{FF2B5EF4-FFF2-40B4-BE49-F238E27FC236}">
+                <a16:creationId xmlns:a16="http://schemas.microsoft.com/office/drawing/2014/main" id="{33BC8242-B6DD-4F20-9731-BC3841B53D8E}"/>
+              </a:ext>
+            </a:extLst>
+          </p:cNvPr>
+          <p:cNvSpPr txBox="1">
+            <a:spLocks/>
+          </p:cNvSpPr>
+          <p:nvPr/>
+        </p:nvSpPr>
+        <p:spPr>
+          <a:xfrm>
+            <a:off x="457200" y="4960137"/>
+            <a:ext cx="7772400" cy="1463040"/>
+          </a:xfrm>
+          <a:prstGeom prst="rect">
+            <a:avLst/>
+          </a:prstGeom>
+        </p:spPr>
+        <p:txBody>
+          <a:bodyPr vert="horz" lIns="91440" tIns="45720" rIns="91440" bIns="45720" rtlCol="0" anchor="ctr">
+            <a:normAutofit/>
+          </a:bodyPr>
+          <a:lstStyle>
+            <a:lvl1pPr algn="r" defTabSz="914400" rtl="0" eaLnBrk="1" latinLnBrk="0" hangingPunct="1">
+              <a:lnSpc>
+                <a:spcPct val="80000"/>
+              </a:lnSpc>
+              <a:spcBef>
+                <a:spcPct val="0"/>
+              </a:spcBef>
+              <a:buNone/>
+              <a:defRPr sz="5000" kern="1200" cap="all" spc="200" baseline="0">
+                <a:solidFill>
+                  <a:schemeClr val="tx1">
+                    <a:lumMod val="95000"/>
+                    <a:lumOff val="5000"/>
+                  </a:schemeClr>
+                </a:solidFill>
+                <a:latin typeface="+mj-lt"/>
+                <a:ea typeface="+mj-ea"/>
+                <a:cs typeface="+mj-cs"/>
+              </a:defRPr>
+            </a:lvl1pPr>
+          </a:lstStyle>
+          <a:p>
+            <a:r>
+              <a:rPr lang="pt-BR" dirty="0"/>
+              <a:t>Dificuldade em diferenciar cursos de ti</a:t>
+            </a:r>
+          </a:p>
+        </p:txBody>
+      </p:sp>
+      <p:sp>
+        <p:nvSpPr>
+          <p:cNvPr id="4" name="Retângulo 3">
+            <a:extLst>
+              <a:ext uri="{FF2B5EF4-FFF2-40B4-BE49-F238E27FC236}">
+                <a16:creationId xmlns:a16="http://schemas.microsoft.com/office/drawing/2014/main" id="{CE1FBFFD-7A96-4504-9862-666C6CAB04E3}"/>
+              </a:ext>
+            </a:extLst>
+          </p:cNvPr>
+          <p:cNvSpPr/>
+          <p:nvPr/>
+        </p:nvSpPr>
+        <p:spPr>
+          <a:xfrm>
+            <a:off x="0" y="4281854"/>
+            <a:ext cx="12192000" cy="290146"/>
+          </a:xfrm>
+          <a:prstGeom prst="rect">
+            <a:avLst/>
+          </a:prstGeom>
+        </p:spPr>
+        <p:style>
+          <a:lnRef idx="2">
+            <a:schemeClr val="accent1">
+              <a:shade val="50000"/>
+            </a:schemeClr>
+          </a:lnRef>
+          <a:fillRef idx="1">
+            <a:schemeClr val="accent1"/>
+          </a:fillRef>
+          <a:effectRef idx="0">
+            <a:schemeClr val="accent1"/>
+          </a:effectRef>
+          <a:fontRef idx="minor">
+            <a:schemeClr val="lt1"/>
+          </a:fontRef>
+        </p:style>
+        <p:txBody>
+          <a:bodyPr rtlCol="0" anchor="ctr"/>
+          <a:lstStyle/>
+          <a:p>
+            <a:pPr algn="ctr"/>
+            <a:endParaRPr lang="pt-BR"/>
+          </a:p>
+        </p:txBody>
+      </p:sp>
+      <p:sp>
+        <p:nvSpPr>
+          <p:cNvPr id="5" name="CaixaDeTexto 4">
+            <a:extLst>
+              <a:ext uri="{FF2B5EF4-FFF2-40B4-BE49-F238E27FC236}">
+                <a16:creationId xmlns:a16="http://schemas.microsoft.com/office/drawing/2014/main" id="{222E392C-51B8-46F5-A24E-F67013E56C7B}"/>
+              </a:ext>
+            </a:extLst>
+          </p:cNvPr>
+          <p:cNvSpPr txBox="1"/>
+          <p:nvPr/>
+        </p:nvSpPr>
+        <p:spPr>
+          <a:xfrm>
+            <a:off x="4560964" y="501161"/>
+            <a:ext cx="3070071" cy="923330"/>
+          </a:xfrm>
+          <a:prstGeom prst="rect">
+            <a:avLst/>
+          </a:prstGeom>
+          <a:noFill/>
+        </p:spPr>
+        <p:txBody>
+          <a:bodyPr wrap="none" rtlCol="0">
+            <a:spAutoFit/>
+          </a:bodyPr>
+          <a:lstStyle/>
+          <a:p>
+            <a:r>
+              <a:rPr lang="pt-BR" sz="5400" b="1" dirty="0"/>
+              <a:t>Obrigado!</a:t>
+            </a:r>
+            <a:endParaRPr lang="pt-BR" sz="2800" b="1" dirty="0"/>
+          </a:p>
+        </p:txBody>
+      </p:sp>
+      <p:sp>
+        <p:nvSpPr>
+          <p:cNvPr id="7" name="CaixaDeTexto 6">
+            <a:extLst>
+              <a:ext uri="{FF2B5EF4-FFF2-40B4-BE49-F238E27FC236}">
+                <a16:creationId xmlns:a16="http://schemas.microsoft.com/office/drawing/2014/main" id="{981BB574-24E8-48BF-95C0-8EA460505713}"/>
+              </a:ext>
+            </a:extLst>
+          </p:cNvPr>
+          <p:cNvSpPr txBox="1"/>
+          <p:nvPr/>
+        </p:nvSpPr>
+        <p:spPr>
+          <a:xfrm>
+            <a:off x="4591164" y="2294792"/>
+            <a:ext cx="3009670" cy="830997"/>
+          </a:xfrm>
+          <a:prstGeom prst="rect">
+            <a:avLst/>
+          </a:prstGeom>
+          <a:noFill/>
+        </p:spPr>
+        <p:txBody>
+          <a:bodyPr wrap="none" rtlCol="0">
+            <a:spAutoFit/>
+          </a:bodyPr>
+          <a:lstStyle/>
+          <a:p>
+            <a:r>
+              <a:rPr lang="pt-BR" sz="4800" b="1" dirty="0"/>
+              <a:t>Perguntas?</a:t>
+            </a:r>
+          </a:p>
+        </p:txBody>
+      </p:sp>
+    </p:spTree>
+    <p:extLst>
+      <p:ext uri="{BB962C8B-B14F-4D97-AF65-F5344CB8AC3E}">
+        <p14:creationId xmlns:p14="http://schemas.microsoft.com/office/powerpoint/2010/main" val="3379578871"/>
       </p:ext>
     </p:extLst>
   </p:cSld>
@@ -21239,129 +21568,6 @@
           <a:p>
             <a:r>
               <a:rPr lang="pt-BR" dirty="0"/>
-              <a:t>PERSONAS</a:t>
-            </a:r>
-          </a:p>
-        </p:txBody>
-      </p:sp>
-      <p:sp>
-        <p:nvSpPr>
-          <p:cNvPr id="3" name="Espaço Reservado para Conteúdo 2">
-            <a:extLst>
-              <a:ext uri="{FF2B5EF4-FFF2-40B4-BE49-F238E27FC236}">
-                <a16:creationId xmlns:a16="http://schemas.microsoft.com/office/drawing/2014/main" id="{81F67E9F-9312-4350-AF11-95EAAD601478}"/>
-              </a:ext>
-            </a:extLst>
-          </p:cNvPr>
-          <p:cNvSpPr>
-            <a:spLocks noGrp="1"/>
-          </p:cNvSpPr>
-          <p:nvPr>
-            <p:ph idx="1"/>
-          </p:nvPr>
-        </p:nvSpPr>
-        <p:spPr/>
-        <p:txBody>
-          <a:bodyPr/>
-          <a:lstStyle/>
-          <a:p>
-            <a:pPr marL="0" indent="0">
-              <a:buNone/>
-            </a:pPr>
-            <a:r>
-              <a:rPr lang="pt-BR" dirty="0"/>
-              <a:t>Enzo, 16 anos</a:t>
-            </a:r>
-          </a:p>
-          <a:p>
-            <a:pPr lvl="4">
-              <a:buFont typeface="Arial" panose="020B0604020202020204" pitchFamily="34" charset="0"/>
-              <a:buChar char="•"/>
-            </a:pPr>
-            <a:r>
-              <a:rPr lang="pt-BR" sz="2000" dirty="0"/>
-              <a:t>Passa a maior parte do tempo no computador;</a:t>
-            </a:r>
-          </a:p>
-          <a:p>
-            <a:pPr lvl="4">
-              <a:buFont typeface="Arial" panose="020B0604020202020204" pitchFamily="34" charset="0"/>
-              <a:buChar char="•"/>
-            </a:pPr>
-            <a:r>
-              <a:rPr lang="pt-BR" sz="2000" dirty="0"/>
-              <a:t>Consome conteúdos de jogos e tecnologia no tempo livre;</a:t>
-            </a:r>
-          </a:p>
-          <a:p>
-            <a:pPr lvl="4">
-              <a:buFont typeface="Arial" panose="020B0604020202020204" pitchFamily="34" charset="0"/>
-              <a:buChar char="•"/>
-            </a:pPr>
-            <a:r>
-              <a:rPr lang="pt-BR" sz="2000" dirty="0"/>
-              <a:t>No futuro, pretende trabalhar com TI;</a:t>
-            </a:r>
-            <a:r>
-              <a:rPr lang="pt-BR" dirty="0"/>
-              <a:t>	</a:t>
-            </a:r>
-          </a:p>
-        </p:txBody>
-      </p:sp>
-    </p:spTree>
-    <p:extLst>
-      <p:ext uri="{BB962C8B-B14F-4D97-AF65-F5344CB8AC3E}">
-        <p14:creationId xmlns:p14="http://schemas.microsoft.com/office/powerpoint/2010/main" val="1205787911"/>
-      </p:ext>
-    </p:extLst>
-  </p:cSld>
-  <p:clrMapOvr>
-    <a:masterClrMapping/>
-  </p:clrMapOvr>
-</p:sld>
-</file>
-
-<file path=ppt/slides/slide4.xml><?xml version="1.0" encoding="utf-8"?>
-<p:sld xmlns:a="http://schemas.openxmlformats.org/drawingml/2006/main" xmlns:r="http://schemas.openxmlformats.org/officeDocument/2006/relationships" xmlns:p="http://schemas.openxmlformats.org/presentationml/2006/main">
-  <p:cSld>
-    <p:spTree>
-      <p:nvGrpSpPr>
-        <p:cNvPr id="1" name=""/>
-        <p:cNvGrpSpPr/>
-        <p:nvPr/>
-      </p:nvGrpSpPr>
-      <p:grpSpPr>
-        <a:xfrm>
-          <a:off x="0" y="0"/>
-          <a:ext cx="0" cy="0"/>
-          <a:chOff x="0" y="0"/>
-          <a:chExt cx="0" cy="0"/>
-        </a:xfrm>
-      </p:grpSpPr>
-      <p:sp>
-        <p:nvSpPr>
-          <p:cNvPr id="2" name="Título 1">
-            <a:extLst>
-              <a:ext uri="{FF2B5EF4-FFF2-40B4-BE49-F238E27FC236}">
-                <a16:creationId xmlns:a16="http://schemas.microsoft.com/office/drawing/2014/main" id="{7A9D088C-436E-4FEC-816E-BBC68FD25424}"/>
-              </a:ext>
-            </a:extLst>
-          </p:cNvPr>
-          <p:cNvSpPr>
-            <a:spLocks noGrp="1"/>
-          </p:cNvSpPr>
-          <p:nvPr>
-            <p:ph type="title"/>
-          </p:nvPr>
-        </p:nvSpPr>
-        <p:spPr/>
-        <p:txBody>
-          <a:bodyPr/>
-          <a:lstStyle/>
-          <a:p>
-            <a:r>
-              <a:rPr lang="pt-BR" dirty="0"/>
               <a:t>Publico alvo</a:t>
             </a:r>
           </a:p>
@@ -21437,7 +21643,508 @@
 </p:sld>
 </file>
 
+<file path=ppt/slides/slide4.xml><?xml version="1.0" encoding="utf-8"?>
+<p:sld xmlns:a="http://schemas.openxmlformats.org/drawingml/2006/main" xmlns:r="http://schemas.openxmlformats.org/officeDocument/2006/relationships" xmlns:p="http://schemas.openxmlformats.org/presentationml/2006/main">
+  <p:cSld>
+    <p:spTree>
+      <p:nvGrpSpPr>
+        <p:cNvPr id="1" name=""/>
+        <p:cNvGrpSpPr/>
+        <p:nvPr/>
+      </p:nvGrpSpPr>
+      <p:grpSpPr>
+        <a:xfrm>
+          <a:off x="0" y="0"/>
+          <a:ext cx="0" cy="0"/>
+          <a:chOff x="0" y="0"/>
+          <a:chExt cx="0" cy="0"/>
+        </a:xfrm>
+      </p:grpSpPr>
+      <p:sp>
+        <p:nvSpPr>
+          <p:cNvPr id="2" name="Título 1">
+            <a:extLst>
+              <a:ext uri="{FF2B5EF4-FFF2-40B4-BE49-F238E27FC236}">
+                <a16:creationId xmlns:a16="http://schemas.microsoft.com/office/drawing/2014/main" id="{7A9D088C-436E-4FEC-816E-BBC68FD25424}"/>
+              </a:ext>
+            </a:extLst>
+          </p:cNvPr>
+          <p:cNvSpPr>
+            <a:spLocks noGrp="1"/>
+          </p:cNvSpPr>
+          <p:nvPr>
+            <p:ph type="title"/>
+          </p:nvPr>
+        </p:nvSpPr>
+        <p:spPr/>
+        <p:txBody>
+          <a:bodyPr/>
+          <a:lstStyle/>
+          <a:p>
+            <a:r>
+              <a:rPr lang="pt-BR" dirty="0"/>
+              <a:t>PERSONAS</a:t>
+            </a:r>
+          </a:p>
+        </p:txBody>
+      </p:sp>
+      <p:sp>
+        <p:nvSpPr>
+          <p:cNvPr id="3" name="Espaço Reservado para Conteúdo 2">
+            <a:extLst>
+              <a:ext uri="{FF2B5EF4-FFF2-40B4-BE49-F238E27FC236}">
+                <a16:creationId xmlns:a16="http://schemas.microsoft.com/office/drawing/2014/main" id="{81F67E9F-9312-4350-AF11-95EAAD601478}"/>
+              </a:ext>
+            </a:extLst>
+          </p:cNvPr>
+          <p:cNvSpPr>
+            <a:spLocks noGrp="1"/>
+          </p:cNvSpPr>
+          <p:nvPr>
+            <p:ph idx="1"/>
+          </p:nvPr>
+        </p:nvSpPr>
+        <p:spPr>
+          <a:xfrm>
+            <a:off x="1024129" y="2286000"/>
+            <a:ext cx="7558020" cy="4023360"/>
+          </a:xfrm>
+        </p:spPr>
+        <p:txBody>
+          <a:bodyPr>
+            <a:normAutofit/>
+          </a:bodyPr>
+          <a:lstStyle/>
+          <a:p>
+            <a:pPr marL="0" indent="0">
+              <a:buNone/>
+            </a:pPr>
+            <a:r>
+              <a:rPr lang="pt-BR" sz="2800" dirty="0"/>
+              <a:t>Enzo, 16 anos</a:t>
+            </a:r>
+          </a:p>
+          <a:p>
+            <a:pPr lvl="4">
+              <a:buFont typeface="Arial" panose="020B0604020202020204" pitchFamily="34" charset="0"/>
+              <a:buChar char="•"/>
+            </a:pPr>
+            <a:r>
+              <a:rPr lang="pt-BR" sz="2400" dirty="0"/>
+              <a:t>Passa a maior parte do tempo no computador;</a:t>
+            </a:r>
+          </a:p>
+          <a:p>
+            <a:pPr marL="640080" lvl="4" indent="0">
+              <a:buNone/>
+            </a:pPr>
+            <a:endParaRPr lang="pt-BR" sz="2400" dirty="0"/>
+          </a:p>
+          <a:p>
+            <a:pPr lvl="4">
+              <a:buFont typeface="Arial" panose="020B0604020202020204" pitchFamily="34" charset="0"/>
+              <a:buChar char="•"/>
+            </a:pPr>
+            <a:r>
+              <a:rPr lang="pt-BR" sz="2400" dirty="0"/>
+              <a:t>Consome conteúdos de jogos e tecnologia no tempo livre;</a:t>
+            </a:r>
+          </a:p>
+          <a:p>
+            <a:pPr marL="640080" lvl="4" indent="0">
+              <a:buNone/>
+            </a:pPr>
+            <a:endParaRPr lang="pt-BR" sz="2400" dirty="0"/>
+          </a:p>
+          <a:p>
+            <a:pPr lvl="4">
+              <a:buFont typeface="Arial" panose="020B0604020202020204" pitchFamily="34" charset="0"/>
+              <a:buChar char="•"/>
+            </a:pPr>
+            <a:r>
+              <a:rPr lang="pt-BR" sz="2400" dirty="0"/>
+              <a:t>No futuro, pretende trabalhar com TI. Por consumir conteúdos de desenvolvimento, sonha em ser programador.</a:t>
+            </a:r>
+            <a:r>
+              <a:rPr lang="pt-BR" sz="1600" dirty="0"/>
+              <a:t>	</a:t>
+            </a:r>
+          </a:p>
+        </p:txBody>
+      </p:sp>
+      <p:pic>
+        <p:nvPicPr>
+          <p:cNvPr id="2054" name="Picture 6" descr="Index Of Svg Nerds - Nerd Desenho Png, Transparent Png - kindpng">
+            <a:extLst>
+              <a:ext uri="{FF2B5EF4-FFF2-40B4-BE49-F238E27FC236}">
+                <a16:creationId xmlns:a16="http://schemas.microsoft.com/office/drawing/2014/main" id="{2730AD70-5BE3-4FDB-89CC-C3BD5C077209}"/>
+              </a:ext>
+            </a:extLst>
+          </p:cNvPr>
+          <p:cNvPicPr>
+            <a:picLocks noChangeAspect="1" noChangeArrowheads="1"/>
+          </p:cNvPicPr>
+          <p:nvPr/>
+        </p:nvPicPr>
+        <p:blipFill>
+          <a:blip r:embed="rId2">
+            <a:extLst>
+              <a:ext uri="{28A0092B-C50C-407E-A947-70E740481C1C}">
+                <a14:useLocalDpi xmlns:a14="http://schemas.microsoft.com/office/drawing/2010/main" val="0"/>
+              </a:ext>
+            </a:extLst>
+          </a:blip>
+          <a:srcRect/>
+          <a:stretch>
+            <a:fillRect/>
+          </a:stretch>
+        </p:blipFill>
+        <p:spPr bwMode="auto">
+          <a:xfrm>
+            <a:off x="9005819" y="2490940"/>
+            <a:ext cx="2162052" cy="2775651"/>
+          </a:xfrm>
+          <a:prstGeom prst="rect">
+            <a:avLst/>
+          </a:prstGeom>
+          <a:noFill/>
+          <a:extLst>
+            <a:ext uri="{909E8E84-426E-40DD-AFC4-6F175D3DCCD1}">
+              <a14:hiddenFill xmlns:a14="http://schemas.microsoft.com/office/drawing/2010/main">
+                <a:solidFill>
+                  <a:srgbClr val="FFFFFF"/>
+                </a:solidFill>
+              </a14:hiddenFill>
+            </a:ext>
+          </a:extLst>
+        </p:spPr>
+      </p:pic>
+    </p:spTree>
+    <p:extLst>
+      <p:ext uri="{BB962C8B-B14F-4D97-AF65-F5344CB8AC3E}">
+        <p14:creationId xmlns:p14="http://schemas.microsoft.com/office/powerpoint/2010/main" val="1205787911"/>
+      </p:ext>
+    </p:extLst>
+  </p:cSld>
+  <p:clrMapOvr>
+    <a:masterClrMapping/>
+  </p:clrMapOvr>
+</p:sld>
+</file>
+
 <file path=ppt/slides/slide5.xml><?xml version="1.0" encoding="utf-8"?>
+<p:sld xmlns:a="http://schemas.openxmlformats.org/drawingml/2006/main" xmlns:r="http://schemas.openxmlformats.org/officeDocument/2006/relationships" xmlns:p="http://schemas.openxmlformats.org/presentationml/2006/main">
+  <p:cSld>
+    <p:spTree>
+      <p:nvGrpSpPr>
+        <p:cNvPr id="1" name=""/>
+        <p:cNvGrpSpPr/>
+        <p:nvPr/>
+      </p:nvGrpSpPr>
+      <p:grpSpPr>
+        <a:xfrm>
+          <a:off x="0" y="0"/>
+          <a:ext cx="0" cy="0"/>
+          <a:chOff x="0" y="0"/>
+          <a:chExt cx="0" cy="0"/>
+        </a:xfrm>
+      </p:grpSpPr>
+      <p:sp>
+        <p:nvSpPr>
+          <p:cNvPr id="2" name="Título 1">
+            <a:extLst>
+              <a:ext uri="{FF2B5EF4-FFF2-40B4-BE49-F238E27FC236}">
+                <a16:creationId xmlns:a16="http://schemas.microsoft.com/office/drawing/2014/main" id="{2D3C8174-7A89-4CBA-90A5-D036FFA66566}"/>
+              </a:ext>
+            </a:extLst>
+          </p:cNvPr>
+          <p:cNvSpPr>
+            <a:spLocks noGrp="1"/>
+          </p:cNvSpPr>
+          <p:nvPr>
+            <p:ph type="title"/>
+          </p:nvPr>
+        </p:nvSpPr>
+        <p:spPr/>
+        <p:txBody>
+          <a:bodyPr/>
+          <a:lstStyle/>
+          <a:p>
+            <a:r>
+              <a:rPr lang="pt-BR" dirty="0"/>
+              <a:t>Histórias de Usuários</a:t>
+            </a:r>
+          </a:p>
+        </p:txBody>
+      </p:sp>
+      <p:sp>
+        <p:nvSpPr>
+          <p:cNvPr id="3" name="Espaço Reservado para Conteúdo 2">
+            <a:extLst>
+              <a:ext uri="{FF2B5EF4-FFF2-40B4-BE49-F238E27FC236}">
+                <a16:creationId xmlns:a16="http://schemas.microsoft.com/office/drawing/2014/main" id="{144F10D9-F21E-4D16-955C-852C79F4D88A}"/>
+              </a:ext>
+            </a:extLst>
+          </p:cNvPr>
+          <p:cNvSpPr>
+            <a:spLocks noGrp="1"/>
+          </p:cNvSpPr>
+          <p:nvPr>
+            <p:ph idx="1"/>
+          </p:nvPr>
+        </p:nvSpPr>
+        <p:spPr>
+          <a:xfrm>
+            <a:off x="1024128" y="2286000"/>
+            <a:ext cx="9720073" cy="4202723"/>
+          </a:xfrm>
+        </p:spPr>
+        <p:txBody>
+          <a:bodyPr>
+            <a:normAutofit/>
+          </a:bodyPr>
+          <a:lstStyle/>
+          <a:p>
+            <a:pPr lvl="1">
+              <a:buFont typeface="Arial" panose="020B0604020202020204" pitchFamily="34" charset="0"/>
+              <a:buChar char="•"/>
+            </a:pPr>
+            <a:r>
+              <a:rPr lang="pt-BR" sz="2400" dirty="0"/>
+              <a:t>“Encontrar o curso que me agrada pela internet não é fácil, quanto mais leio mais parece que os cursos são iguais”;</a:t>
+            </a:r>
+          </a:p>
+          <a:p>
+            <a:pPr lvl="1">
+              <a:buFont typeface="Arial" panose="020B0604020202020204" pitchFamily="34" charset="0"/>
+              <a:buChar char="•"/>
+            </a:pPr>
+            <a:endParaRPr lang="pt-BR" sz="2400" dirty="0"/>
+          </a:p>
+          <a:p>
+            <a:pPr lvl="1">
+              <a:buFont typeface="Arial" panose="020B0604020202020204" pitchFamily="34" charset="0"/>
+              <a:buChar char="•"/>
+            </a:pPr>
+            <a:r>
+              <a:rPr lang="pt-BR" sz="2400" dirty="0"/>
+              <a:t>“Já fiz diversos cursos de programação na internet, mas a maioria não tem continuidade. Penso em cursar algo na área, mas me disseram que não existe curso especializado em desenvolvimento”.</a:t>
+            </a:r>
+          </a:p>
+          <a:p>
+            <a:pPr marL="128016" lvl="1" indent="0">
+              <a:buNone/>
+            </a:pPr>
+            <a:endParaRPr lang="pt-BR" dirty="0"/>
+          </a:p>
+          <a:p>
+            <a:pPr>
+              <a:buFont typeface="Wingdings" panose="05000000000000000000" pitchFamily="2" charset="2"/>
+              <a:buChar char="§"/>
+            </a:pPr>
+            <a:endParaRPr lang="pt-BR" b="0" dirty="0">
+              <a:solidFill>
+                <a:srgbClr val="D6DEEB"/>
+              </a:solidFill>
+              <a:effectLst/>
+              <a:latin typeface="Consolas" panose="020B0609020204030204" pitchFamily="49" charset="0"/>
+            </a:endParaRPr>
+          </a:p>
+          <a:p>
+            <a:pPr>
+              <a:buFont typeface="Arial" panose="020B0604020202020204" pitchFamily="34" charset="0"/>
+              <a:buChar char="•"/>
+            </a:pPr>
+            <a:endParaRPr lang="pt-BR" dirty="0"/>
+          </a:p>
+        </p:txBody>
+      </p:sp>
+    </p:spTree>
+    <p:extLst>
+      <p:ext uri="{BB962C8B-B14F-4D97-AF65-F5344CB8AC3E}">
+        <p14:creationId xmlns:p14="http://schemas.microsoft.com/office/powerpoint/2010/main" val="1366110978"/>
+      </p:ext>
+    </p:extLst>
+  </p:cSld>
+  <p:clrMapOvr>
+    <a:masterClrMapping/>
+  </p:clrMapOvr>
+</p:sld>
+</file>
+
+<file path=ppt/slides/slide6.xml><?xml version="1.0" encoding="utf-8"?>
+<p:sld xmlns:a="http://schemas.openxmlformats.org/drawingml/2006/main" xmlns:r="http://schemas.openxmlformats.org/officeDocument/2006/relationships" xmlns:p="http://schemas.openxmlformats.org/presentationml/2006/main">
+  <p:cSld>
+    <p:spTree>
+      <p:nvGrpSpPr>
+        <p:cNvPr id="1" name=""/>
+        <p:cNvGrpSpPr/>
+        <p:nvPr/>
+      </p:nvGrpSpPr>
+      <p:grpSpPr>
+        <a:xfrm>
+          <a:off x="0" y="0"/>
+          <a:ext cx="0" cy="0"/>
+          <a:chOff x="0" y="0"/>
+          <a:chExt cx="0" cy="0"/>
+        </a:xfrm>
+      </p:grpSpPr>
+      <p:sp>
+        <p:nvSpPr>
+          <p:cNvPr id="2" name="Título 1">
+            <a:extLst>
+              <a:ext uri="{FF2B5EF4-FFF2-40B4-BE49-F238E27FC236}">
+                <a16:creationId xmlns:a16="http://schemas.microsoft.com/office/drawing/2014/main" id="{7A9F44E0-6B03-4924-8809-18AC44EA6E07}"/>
+              </a:ext>
+            </a:extLst>
+          </p:cNvPr>
+          <p:cNvSpPr>
+            <a:spLocks noGrp="1"/>
+          </p:cNvSpPr>
+          <p:nvPr>
+            <p:ph type="title"/>
+          </p:nvPr>
+        </p:nvSpPr>
+        <p:spPr/>
+        <p:txBody>
+          <a:bodyPr/>
+          <a:lstStyle/>
+          <a:p>
+            <a:r>
+              <a:rPr lang="pt-BR" dirty="0"/>
+              <a:t>requisitos</a:t>
+            </a:r>
+          </a:p>
+        </p:txBody>
+      </p:sp>
+      <p:sp>
+        <p:nvSpPr>
+          <p:cNvPr id="3" name="Espaço Reservado para Conteúdo 2">
+            <a:extLst>
+              <a:ext uri="{FF2B5EF4-FFF2-40B4-BE49-F238E27FC236}">
+                <a16:creationId xmlns:a16="http://schemas.microsoft.com/office/drawing/2014/main" id="{E6D7CD63-DA00-49EC-B946-4C4959A785EE}"/>
+              </a:ext>
+            </a:extLst>
+          </p:cNvPr>
+          <p:cNvSpPr>
+            <a:spLocks noGrp="1"/>
+          </p:cNvSpPr>
+          <p:nvPr>
+            <p:ph idx="1"/>
+          </p:nvPr>
+        </p:nvSpPr>
+        <p:spPr/>
+        <p:txBody>
+          <a:bodyPr/>
+          <a:lstStyle/>
+          <a:p>
+            <a:pPr marL="0" indent="0">
+              <a:buNone/>
+            </a:pPr>
+            <a:r>
+              <a:rPr lang="pt-BR" dirty="0"/>
+              <a:t>Requisitos Funcionais</a:t>
+            </a:r>
+          </a:p>
+          <a:p>
+            <a:pPr lvl="1">
+              <a:buFont typeface="Arial" panose="020B0604020202020204" pitchFamily="34" charset="0"/>
+              <a:buChar char="•"/>
+            </a:pPr>
+            <a:r>
+              <a:rPr lang="pt-BR" b="0" i="0" dirty="0">
+                <a:effectLst/>
+              </a:rPr>
+              <a:t>Ajudar o usuário a identificar o curso que se enquadra em seu perfil;</a:t>
+            </a:r>
+          </a:p>
+          <a:p>
+            <a:pPr marL="128016" lvl="1" indent="0">
+              <a:buNone/>
+            </a:pPr>
+            <a:endParaRPr lang="pt-BR" b="0" i="0" dirty="0">
+              <a:effectLst/>
+            </a:endParaRPr>
+          </a:p>
+          <a:p>
+            <a:pPr lvl="1">
+              <a:buFont typeface="Arial" panose="020B0604020202020204" pitchFamily="34" charset="0"/>
+              <a:buChar char="•"/>
+            </a:pPr>
+            <a:r>
+              <a:rPr lang="pt-BR" b="0" dirty="0">
+                <a:effectLst/>
+              </a:rPr>
+              <a:t>Listagem dos cursos de TI com uma breve descrição.</a:t>
+            </a:r>
+          </a:p>
+          <a:p>
+            <a:pPr marL="0" indent="0">
+              <a:buNone/>
+            </a:pPr>
+            <a:endParaRPr lang="pt-BR" dirty="0"/>
+          </a:p>
+          <a:p>
+            <a:pPr marL="0" indent="0">
+              <a:buNone/>
+            </a:pPr>
+            <a:r>
+              <a:rPr lang="pt-BR" dirty="0"/>
+              <a:t>Requisitos Não Funcionais</a:t>
+            </a:r>
+          </a:p>
+          <a:p>
+            <a:pPr lvl="1">
+              <a:buFont typeface="Arial" panose="020B0604020202020204" pitchFamily="34" charset="0"/>
+              <a:buChar char="•"/>
+            </a:pPr>
+            <a:r>
+              <a:rPr lang="pt-BR" b="0" dirty="0">
+                <a:effectLst/>
+              </a:rPr>
+              <a:t>O sistema deve ser responsivo para rodar em um dispositivos móvel;</a:t>
+            </a:r>
+          </a:p>
+          <a:p>
+            <a:pPr marL="128016" lvl="1" indent="0">
+              <a:buNone/>
+            </a:pPr>
+            <a:endParaRPr lang="pt-BR" b="0" dirty="0">
+              <a:effectLst/>
+            </a:endParaRPr>
+          </a:p>
+          <a:p>
+            <a:pPr lvl="1">
+              <a:buFont typeface="Arial" panose="020B0604020202020204" pitchFamily="34" charset="0"/>
+              <a:buChar char="•"/>
+            </a:pPr>
+            <a:r>
+              <a:rPr lang="pt-BR" dirty="0"/>
+              <a:t>Montagem de uma base de dados relacionando perfis de usuário à cursos de TI.</a:t>
+            </a:r>
+            <a:endParaRPr lang="pt-BR" b="0" dirty="0">
+              <a:effectLst/>
+            </a:endParaRPr>
+          </a:p>
+          <a:p>
+            <a:endParaRPr lang="pt-BR" dirty="0"/>
+          </a:p>
+        </p:txBody>
+      </p:sp>
+    </p:spTree>
+    <p:extLst>
+      <p:ext uri="{BB962C8B-B14F-4D97-AF65-F5344CB8AC3E}">
+        <p14:creationId xmlns:p14="http://schemas.microsoft.com/office/powerpoint/2010/main" val="1737865031"/>
+      </p:ext>
+    </p:extLst>
+  </p:cSld>
+  <p:clrMapOvr>
+    <a:masterClrMapping/>
+  </p:clrMapOvr>
+</p:sld>
+</file>
+
+<file path=ppt/slides/slide7.xml><?xml version="1.0" encoding="utf-8"?>
 <p:sld xmlns:a="http://schemas.openxmlformats.org/drawingml/2006/main" xmlns:r="http://schemas.openxmlformats.org/officeDocument/2006/relationships" xmlns:p="http://schemas.openxmlformats.org/presentationml/2006/main">
   <p:cSld>
     <p:spTree>
@@ -21477,7 +22184,7 @@
           <a:p>
             <a:r>
               <a:rPr lang="pt-BR" dirty="0"/>
-              <a:t>Proposta de Solução | Objetivos</a:t>
+              <a:t>Solução</a:t>
             </a:r>
           </a:p>
         </p:txBody>
@@ -21513,6 +22220,12 @@
             </a:r>
           </a:p>
           <a:p>
+            <a:pPr marL="0" indent="0">
+              <a:buNone/>
+            </a:pPr>
+            <a:endParaRPr lang="pt-BR" dirty="0"/>
+          </a:p>
+          <a:p>
             <a:pPr>
               <a:buFont typeface="Arial" panose="020B0604020202020204" pitchFamily="34" charset="0"/>
               <a:buChar char="•"/>
@@ -21523,6 +22236,12 @@
             </a:r>
           </a:p>
           <a:p>
+            <a:pPr marL="0" indent="0">
+              <a:buNone/>
+            </a:pPr>
+            <a:endParaRPr lang="pt-BR" dirty="0"/>
+          </a:p>
+          <a:p>
             <a:pPr>
               <a:buFont typeface="Arial" panose="020B0604020202020204" pitchFamily="34" charset="0"/>
               <a:buChar char="•"/>
@@ -21531,6 +22250,12 @@
               <a:rPr lang="pt-BR" dirty="0"/>
               <a:t> Aproximar o usuário de universidades que oferecem cursos da área;</a:t>
             </a:r>
+          </a:p>
+          <a:p>
+            <a:pPr marL="0" indent="0">
+              <a:buNone/>
+            </a:pPr>
+            <a:endParaRPr lang="pt-BR" dirty="0"/>
           </a:p>
           <a:p>
             <a:pPr>
@@ -21557,210 +22282,7 @@
 </p:sld>
 </file>
 
-<file path=ppt/slides/slide6.xml><?xml version="1.0" encoding="utf-8"?>
-<p:sld xmlns:a="http://schemas.openxmlformats.org/drawingml/2006/main" xmlns:r="http://schemas.openxmlformats.org/officeDocument/2006/relationships" xmlns:p="http://schemas.openxmlformats.org/presentationml/2006/main">
-  <p:cSld>
-    <p:spTree>
-      <p:nvGrpSpPr>
-        <p:cNvPr id="1" name=""/>
-        <p:cNvGrpSpPr/>
-        <p:nvPr/>
-      </p:nvGrpSpPr>
-      <p:grpSpPr>
-        <a:xfrm>
-          <a:off x="0" y="0"/>
-          <a:ext cx="0" cy="0"/>
-          <a:chOff x="0" y="0"/>
-          <a:chExt cx="0" cy="0"/>
-        </a:xfrm>
-      </p:grpSpPr>
-      <p:sp>
-        <p:nvSpPr>
-          <p:cNvPr id="2" name="Título 1">
-            <a:extLst>
-              <a:ext uri="{FF2B5EF4-FFF2-40B4-BE49-F238E27FC236}">
-                <a16:creationId xmlns:a16="http://schemas.microsoft.com/office/drawing/2014/main" id="{2D3C8174-7A89-4CBA-90A5-D036FFA66566}"/>
-              </a:ext>
-            </a:extLst>
-          </p:cNvPr>
-          <p:cNvSpPr>
-            <a:spLocks noGrp="1"/>
-          </p:cNvSpPr>
-          <p:nvPr>
-            <p:ph type="title"/>
-          </p:nvPr>
-        </p:nvSpPr>
-        <p:spPr/>
-        <p:txBody>
-          <a:bodyPr/>
-          <a:lstStyle/>
-          <a:p>
-            <a:r>
-              <a:rPr lang="pt-BR" dirty="0"/>
-              <a:t>Histórias de Usuários e Requisitos</a:t>
-            </a:r>
-          </a:p>
-        </p:txBody>
-      </p:sp>
-      <p:sp>
-        <p:nvSpPr>
-          <p:cNvPr id="3" name="Espaço Reservado para Conteúdo 2">
-            <a:extLst>
-              <a:ext uri="{FF2B5EF4-FFF2-40B4-BE49-F238E27FC236}">
-                <a16:creationId xmlns:a16="http://schemas.microsoft.com/office/drawing/2014/main" id="{144F10D9-F21E-4D16-955C-852C79F4D88A}"/>
-              </a:ext>
-            </a:extLst>
-          </p:cNvPr>
-          <p:cNvSpPr>
-            <a:spLocks noGrp="1"/>
-          </p:cNvSpPr>
-          <p:nvPr>
-            <p:ph idx="1"/>
-          </p:nvPr>
-        </p:nvSpPr>
-        <p:spPr>
-          <a:xfrm>
-            <a:off x="1024128" y="2286000"/>
-            <a:ext cx="9720073" cy="4202723"/>
-          </a:xfrm>
-        </p:spPr>
-        <p:txBody>
-          <a:bodyPr>
-            <a:normAutofit fontScale="92500" lnSpcReduction="10000"/>
-          </a:bodyPr>
-          <a:lstStyle/>
-          <a:p>
-            <a:pPr marL="0" indent="0">
-              <a:buNone/>
-            </a:pPr>
-            <a:r>
-              <a:rPr lang="pt-BR" dirty="0"/>
-              <a:t>Histórias de Usuários</a:t>
-            </a:r>
-          </a:p>
-          <a:p>
-            <a:pPr marL="266700" indent="-266700">
-              <a:buFont typeface="Wingdings" panose="05000000000000000000" pitchFamily="2" charset="2"/>
-              <a:buChar char="§"/>
-            </a:pPr>
-            <a:r>
-              <a:rPr lang="pt-BR" dirty="0"/>
-              <a:t>“Encontrar o curso que me agrada pela internet não é fácil, quanto mais leio mais parece que os cursos são iguais”;</a:t>
-            </a:r>
-          </a:p>
-          <a:p>
-            <a:pPr marL="0" indent="0">
-              <a:buNone/>
-            </a:pPr>
-            <a:r>
-              <a:rPr lang="pt-BR" dirty="0"/>
-              <a:t>Requisitos Funcionais</a:t>
-            </a:r>
-          </a:p>
-          <a:p>
-            <a:pPr marL="266700" indent="-266700">
-              <a:buFont typeface="Wingdings" panose="05000000000000000000" pitchFamily="2" charset="2"/>
-              <a:buChar char="§"/>
-            </a:pPr>
-            <a:r>
-              <a:rPr lang="pt-BR" b="0" i="0" dirty="0">
-                <a:effectLst/>
-              </a:rPr>
-              <a:t>Formulário para identificar o curso que usuário assemelha;</a:t>
-            </a:r>
-          </a:p>
-          <a:p>
-            <a:pPr marL="266700" indent="-266700">
-              <a:buFont typeface="Wingdings" panose="05000000000000000000" pitchFamily="2" charset="2"/>
-              <a:buChar char="§"/>
-            </a:pPr>
-            <a:r>
-              <a:rPr lang="pt-BR" b="0" dirty="0">
-                <a:effectLst/>
-              </a:rPr>
-              <a:t>Listagem dos cursos de TI com uma breve descrição.</a:t>
-            </a:r>
-          </a:p>
-          <a:p>
-            <a:pPr marL="0" indent="0">
-              <a:buNone/>
-            </a:pPr>
-            <a:endParaRPr lang="pt-BR" dirty="0"/>
-          </a:p>
-          <a:p>
-            <a:pPr marL="0" indent="0">
-              <a:buNone/>
-            </a:pPr>
-            <a:r>
-              <a:rPr lang="pt-BR" dirty="0"/>
-              <a:t>Requisitos Não Funcionais</a:t>
-            </a:r>
-          </a:p>
-          <a:p>
-            <a:pPr>
-              <a:buFont typeface="Wingdings" panose="05000000000000000000" pitchFamily="2" charset="2"/>
-              <a:buChar char="§"/>
-            </a:pPr>
-            <a:r>
-              <a:rPr lang="pt-BR" dirty="0"/>
-              <a:t> </a:t>
-            </a:r>
-            <a:r>
-              <a:rPr lang="pt-BR" b="0" dirty="0">
-                <a:effectLst/>
-              </a:rPr>
-              <a:t>O sistema deve ser responsivo para rodar em um dispositivos móvel;</a:t>
-            </a:r>
-          </a:p>
-          <a:p>
-            <a:pPr>
-              <a:buFont typeface="Wingdings" panose="05000000000000000000" pitchFamily="2" charset="2"/>
-              <a:buChar char="§"/>
-            </a:pPr>
-            <a:r>
-              <a:rPr lang="pt-BR" dirty="0"/>
-              <a:t> Montagem de uma base de dados relacionando perfis de usuário à cursos de TI.</a:t>
-            </a:r>
-            <a:endParaRPr lang="pt-BR" b="0" dirty="0">
-              <a:effectLst/>
-            </a:endParaRPr>
-          </a:p>
-          <a:p>
-            <a:pPr>
-              <a:buFont typeface="Wingdings" panose="05000000000000000000" pitchFamily="2" charset="2"/>
-              <a:buChar char="§"/>
-            </a:pPr>
-            <a:endParaRPr lang="pt-BR" b="0" dirty="0">
-              <a:solidFill>
-                <a:srgbClr val="D6DEEB"/>
-              </a:solidFill>
-              <a:effectLst/>
-              <a:latin typeface="Consolas" panose="020B0609020204030204" pitchFamily="49" charset="0"/>
-            </a:endParaRPr>
-          </a:p>
-          <a:p>
-            <a:pPr>
-              <a:buFont typeface="Arial" panose="020B0604020202020204" pitchFamily="34" charset="0"/>
-              <a:buChar char="•"/>
-            </a:pPr>
-            <a:endParaRPr lang="pt-BR" dirty="0"/>
-          </a:p>
-        </p:txBody>
-      </p:sp>
-    </p:spTree>
-    <p:extLst>
-      <p:ext uri="{BB962C8B-B14F-4D97-AF65-F5344CB8AC3E}">
-        <p14:creationId xmlns:p14="http://schemas.microsoft.com/office/powerpoint/2010/main" val="1366110978"/>
-      </p:ext>
-    </p:extLst>
-  </p:cSld>
-  <p:clrMapOvr>
-    <a:masterClrMapping/>
-  </p:clrMapOvr>
-</p:sld>
-</file>
-
-<file path=ppt/slides/slide7.xml><?xml version="1.0" encoding="utf-8"?>
+<file path=ppt/slides/slide8.xml><?xml version="1.0" encoding="utf-8"?>
 <p:sld xmlns:a="http://schemas.openxmlformats.org/drawingml/2006/main" xmlns:r="http://schemas.openxmlformats.org/officeDocument/2006/relationships" xmlns:p="http://schemas.openxmlformats.org/presentationml/2006/main">
   <p:cSld>
     <p:spTree>
@@ -21930,7 +22452,7 @@
 </p:sld>
 </file>
 
-<file path=ppt/slides/slide8.xml><?xml version="1.0" encoding="utf-8"?>
+<file path=ppt/slides/slide9.xml><?xml version="1.0" encoding="utf-8"?>
 <p:sld xmlns:a="http://schemas.openxmlformats.org/drawingml/2006/main" xmlns:r="http://schemas.openxmlformats.org/officeDocument/2006/relationships" xmlns:p="http://schemas.openxmlformats.org/presentationml/2006/main">
   <p:cSld>
     <p:spTree>
@@ -21993,7 +22515,9 @@
         </p:nvSpPr>
         <p:spPr/>
         <p:txBody>
-          <a:bodyPr/>
+          <a:bodyPr>
+            <a:normAutofit lnSpcReduction="10000"/>
+          </a:bodyPr>
           <a:lstStyle/>
           <a:p>
             <a:pPr>
@@ -22014,6 +22538,12 @@
             </a:r>
           </a:p>
           <a:p>
+            <a:pPr marL="0" indent="0">
+              <a:buNone/>
+            </a:pPr>
+            <a:endParaRPr lang="pt-BR" dirty="0"/>
+          </a:p>
+          <a:p>
             <a:pPr>
               <a:buFont typeface="Arial" panose="020B0604020202020204" pitchFamily="34" charset="0"/>
               <a:buChar char="•"/>
@@ -22022,6 +22552,12 @@
               <a:rPr lang="pt-BR" dirty="0"/>
               <a:t> A divisão de papéis foi embasada na pontuação de história Scrum;</a:t>
             </a:r>
+          </a:p>
+          <a:p>
+            <a:pPr marL="0" indent="0">
+              <a:buNone/>
+            </a:pPr>
+            <a:endParaRPr lang="pt-BR" dirty="0"/>
           </a:p>
           <a:p>
             <a:pPr>
@@ -22063,6 +22599,12 @@
             <a:endParaRPr lang="pt-BR" dirty="0"/>
           </a:p>
           <a:p>
+            <a:pPr marL="0" indent="0">
+              <a:buNone/>
+            </a:pPr>
+            <a:endParaRPr lang="pt-BR" dirty="0"/>
+          </a:p>
+          <a:p>
             <a:pPr>
               <a:buFont typeface="Arial" panose="020B0604020202020204" pitchFamily="34" charset="0"/>
               <a:buChar char="•"/>
@@ -22100,211 +22642,6 @@
     <p:extLst>
       <p:ext uri="{BB962C8B-B14F-4D97-AF65-F5344CB8AC3E}">
         <p14:creationId xmlns:p14="http://schemas.microsoft.com/office/powerpoint/2010/main" val="2874110374"/>
-      </p:ext>
-    </p:extLst>
-  </p:cSld>
-  <p:clrMapOvr>
-    <a:masterClrMapping/>
-  </p:clrMapOvr>
-</p:sld>
-</file>
-
-<file path=ppt/slides/slide9.xml><?xml version="1.0" encoding="utf-8"?>
-<p:sld xmlns:a="http://schemas.openxmlformats.org/drawingml/2006/main" xmlns:r="http://schemas.openxmlformats.org/officeDocument/2006/relationships" xmlns:p="http://schemas.openxmlformats.org/presentationml/2006/main">
-  <p:cSld>
-    <p:spTree>
-      <p:nvGrpSpPr>
-        <p:cNvPr id="1" name=""/>
-        <p:cNvGrpSpPr/>
-        <p:nvPr/>
-      </p:nvGrpSpPr>
-      <p:grpSpPr>
-        <a:xfrm>
-          <a:off x="0" y="0"/>
-          <a:ext cx="0" cy="0"/>
-          <a:chOff x="0" y="0"/>
-          <a:chExt cx="0" cy="0"/>
-        </a:xfrm>
-      </p:grpSpPr>
-      <p:sp>
-        <p:nvSpPr>
-          <p:cNvPr id="6" name="Espaço Reservado para Texto 5">
-            <a:extLst>
-              <a:ext uri="{FF2B5EF4-FFF2-40B4-BE49-F238E27FC236}">
-                <a16:creationId xmlns:a16="http://schemas.microsoft.com/office/drawing/2014/main" id="{FF277B38-6BF8-40CC-929C-430FF75E2516}"/>
-              </a:ext>
-            </a:extLst>
-          </p:cNvPr>
-          <p:cNvSpPr>
-            <a:spLocks noGrp="1"/>
-          </p:cNvSpPr>
-          <p:nvPr>
-            <p:ph type="body" sz="half" idx="2"/>
-          </p:nvPr>
-        </p:nvSpPr>
-        <p:spPr/>
-        <p:txBody>
-          <a:bodyPr/>
-          <a:lstStyle/>
-          <a:p>
-            <a:pPr lvl="0"/>
-            <a:r>
-              <a:rPr lang="pt-BR" sz="2400" b="1" dirty="0"/>
-              <a:t>Equipe</a:t>
-            </a:r>
-            <a:endParaRPr lang="pt-BR" b="1" dirty="0"/>
-          </a:p>
-          <a:p>
-            <a:pPr marL="285750" lvl="0" indent="-285750">
-              <a:buFont typeface="Arial" panose="020B0604020202020204" pitchFamily="34" charset="0"/>
-              <a:buChar char="•"/>
-            </a:pPr>
-            <a:r>
-              <a:rPr lang="pt-BR" dirty="0"/>
-              <a:t>Miguel Alves</a:t>
-            </a:r>
-          </a:p>
-          <a:p>
-            <a:pPr marL="285750" lvl="0" indent="-285750">
-              <a:buFont typeface="Arial" panose="020B0604020202020204" pitchFamily="34" charset="0"/>
-              <a:buChar char="•"/>
-            </a:pPr>
-            <a:r>
-              <a:rPr lang="pt-BR" dirty="0" err="1"/>
-              <a:t>Melyssa</a:t>
-            </a:r>
-            <a:r>
-              <a:rPr lang="pt-BR" dirty="0"/>
-              <a:t> Meireles</a:t>
-            </a:r>
-          </a:p>
-          <a:p>
-            <a:pPr marL="285750" lvl="0" indent="-285750">
-              <a:buFont typeface="Arial" panose="020B0604020202020204" pitchFamily="34" charset="0"/>
-              <a:buChar char="•"/>
-            </a:pPr>
-            <a:r>
-              <a:rPr lang="pt-BR" dirty="0"/>
-              <a:t>Gabriel </a:t>
-            </a:r>
-            <a:r>
-              <a:rPr lang="pt-BR" dirty="0" err="1"/>
-              <a:t>Herolt</a:t>
-            </a:r>
-            <a:endParaRPr lang="pt-BR" dirty="0"/>
-          </a:p>
-          <a:p>
-            <a:endParaRPr lang="pt-BR" dirty="0"/>
-          </a:p>
-        </p:txBody>
-      </p:sp>
-      <p:pic>
-        <p:nvPicPr>
-          <p:cNvPr id="1026" name="Picture 2">
-            <a:extLst>
-              <a:ext uri="{FF2B5EF4-FFF2-40B4-BE49-F238E27FC236}">
-                <a16:creationId xmlns:a16="http://schemas.microsoft.com/office/drawing/2014/main" id="{7A6077C5-D874-4EB6-922B-F4E71AA55FFE}"/>
-              </a:ext>
-            </a:extLst>
-          </p:cNvPr>
-          <p:cNvPicPr>
-            <a:picLocks noGrp="1" noChangeAspect="1" noChangeArrowheads="1"/>
-          </p:cNvPicPr>
-          <p:nvPr>
-            <p:ph type="pic" idx="1"/>
-          </p:nvPr>
-        </p:nvPicPr>
-        <p:blipFill>
-          <a:blip r:embed="rId2">
-            <a:extLst>
-              <a:ext uri="{28A0092B-C50C-407E-A947-70E740481C1C}">
-                <a14:useLocalDpi xmlns:a14="http://schemas.microsoft.com/office/drawing/2010/main" val="0"/>
-              </a:ext>
-            </a:extLst>
-          </a:blip>
-          <a:srcRect t="14276" b="14276"/>
-          <a:stretch>
-            <a:fillRect/>
-          </a:stretch>
-        </p:blipFill>
-        <p:spPr bwMode="auto">
-          <a:prstGeom prst="rect">
-            <a:avLst/>
-          </a:prstGeom>
-          <a:noFill/>
-          <a:extLst>
-            <a:ext uri="{909E8E84-426E-40DD-AFC4-6F175D3DCCD1}">
-              <a14:hiddenFill xmlns:a14="http://schemas.microsoft.com/office/drawing/2010/main">
-                <a:solidFill>
-                  <a:srgbClr val="FFFFFF"/>
-                </a:solidFill>
-              </a14:hiddenFill>
-            </a:ext>
-          </a:extLst>
-        </p:spPr>
-      </p:pic>
-      <p:sp>
-        <p:nvSpPr>
-          <p:cNvPr id="8" name="Título 1">
-            <a:extLst>
-              <a:ext uri="{FF2B5EF4-FFF2-40B4-BE49-F238E27FC236}">
-                <a16:creationId xmlns:a16="http://schemas.microsoft.com/office/drawing/2014/main" id="{33BC8242-B6DD-4F20-9731-BC3841B53D8E}"/>
-              </a:ext>
-            </a:extLst>
-          </p:cNvPr>
-          <p:cNvSpPr txBox="1">
-            <a:spLocks/>
-          </p:cNvSpPr>
-          <p:nvPr/>
-        </p:nvSpPr>
-        <p:spPr>
-          <a:xfrm>
-            <a:off x="457200" y="4960137"/>
-            <a:ext cx="7772400" cy="1463040"/>
-          </a:xfrm>
-          <a:prstGeom prst="rect">
-            <a:avLst/>
-          </a:prstGeom>
-        </p:spPr>
-        <p:txBody>
-          <a:bodyPr vert="horz" lIns="91440" tIns="45720" rIns="91440" bIns="45720" rtlCol="0" anchor="ctr">
-            <a:normAutofit/>
-          </a:bodyPr>
-          <a:lstStyle>
-            <a:lvl1pPr algn="r" defTabSz="914400" rtl="0" eaLnBrk="1" latinLnBrk="0" hangingPunct="1">
-              <a:lnSpc>
-                <a:spcPct val="80000"/>
-              </a:lnSpc>
-              <a:spcBef>
-                <a:spcPct val="0"/>
-              </a:spcBef>
-              <a:buNone/>
-              <a:defRPr sz="5000" kern="1200" cap="all" spc="200" baseline="0">
-                <a:solidFill>
-                  <a:schemeClr val="tx1">
-                    <a:lumMod val="95000"/>
-                    <a:lumOff val="5000"/>
-                  </a:schemeClr>
-                </a:solidFill>
-                <a:latin typeface="+mj-lt"/>
-                <a:ea typeface="+mj-ea"/>
-                <a:cs typeface="+mj-cs"/>
-              </a:defRPr>
-            </a:lvl1pPr>
-          </a:lstStyle>
-          <a:p>
-            <a:r>
-              <a:rPr lang="pt-BR"/>
-              <a:t>Dificuldade em diferenciar cursos de ti</a:t>
-            </a:r>
-            <a:endParaRPr lang="pt-BR" dirty="0"/>
-          </a:p>
-        </p:txBody>
-      </p:sp>
-    </p:spTree>
-    <p:extLst>
-      <p:ext uri="{BB962C8B-B14F-4D97-AF65-F5344CB8AC3E}">
-        <p14:creationId xmlns:p14="http://schemas.microsoft.com/office/powerpoint/2010/main" val="3379578871"/>
       </p:ext>
     </p:extLst>
   </p:cSld>

</xml_diff>